<commit_message>
Modificato file presentazione notifications center e rinominati file rimanenti
</commit_message>
<xml_diff>
--- a/Notifications Center SMS.pptx
+++ b/Notifications Center SMS.pptx
@@ -5,7 +5,8 @@
     <p:sldMasterId id="2147483648" r:id="rId1"/>
   </p:sldMasterIdLst>
   <p:sldIdLst>
-    <p:sldId id="256" r:id="rId2"/>
+    <p:sldId id="257" r:id="rId2"/>
+    <p:sldId id="256" r:id="rId3"/>
   </p:sldIdLst>
   <p:sldSz cx="12192000" cy="6858000"/>
   <p:notesSz cx="6858000" cy="9144000"/>
@@ -259,7 +260,7 @@
           <a:p>
             <a:fld id="{BC1B2DE6-282A-4944-85CD-857AA4A79E28}" type="datetimeFigureOut">
               <a:rPr lang="it-IT" smtClean="0"/>
-              <a:t>13/02/2018</a:t>
+              <a:t>19/02/2018</a:t>
             </a:fld>
             <a:endParaRPr lang="it-IT"/>
           </a:p>
@@ -457,7 +458,7 @@
           <a:p>
             <a:fld id="{BC1B2DE6-282A-4944-85CD-857AA4A79E28}" type="datetimeFigureOut">
               <a:rPr lang="it-IT" smtClean="0"/>
-              <a:t>13/02/2018</a:t>
+              <a:t>19/02/2018</a:t>
             </a:fld>
             <a:endParaRPr lang="it-IT"/>
           </a:p>
@@ -665,7 +666,7 @@
           <a:p>
             <a:fld id="{BC1B2DE6-282A-4944-85CD-857AA4A79E28}" type="datetimeFigureOut">
               <a:rPr lang="it-IT" smtClean="0"/>
-              <a:t>13/02/2018</a:t>
+              <a:t>19/02/2018</a:t>
             </a:fld>
             <a:endParaRPr lang="it-IT"/>
           </a:p>
@@ -863,7 +864,7 @@
           <a:p>
             <a:fld id="{BC1B2DE6-282A-4944-85CD-857AA4A79E28}" type="datetimeFigureOut">
               <a:rPr lang="it-IT" smtClean="0"/>
-              <a:t>13/02/2018</a:t>
+              <a:t>19/02/2018</a:t>
             </a:fld>
             <a:endParaRPr lang="it-IT"/>
           </a:p>
@@ -1138,7 +1139,7 @@
           <a:p>
             <a:fld id="{BC1B2DE6-282A-4944-85CD-857AA4A79E28}" type="datetimeFigureOut">
               <a:rPr lang="it-IT" smtClean="0"/>
-              <a:t>13/02/2018</a:t>
+              <a:t>19/02/2018</a:t>
             </a:fld>
             <a:endParaRPr lang="it-IT"/>
           </a:p>
@@ -1403,7 +1404,7 @@
           <a:p>
             <a:fld id="{BC1B2DE6-282A-4944-85CD-857AA4A79E28}" type="datetimeFigureOut">
               <a:rPr lang="it-IT" smtClean="0"/>
-              <a:t>13/02/2018</a:t>
+              <a:t>19/02/2018</a:t>
             </a:fld>
             <a:endParaRPr lang="it-IT"/>
           </a:p>
@@ -1815,7 +1816,7 @@
           <a:p>
             <a:fld id="{BC1B2DE6-282A-4944-85CD-857AA4A79E28}" type="datetimeFigureOut">
               <a:rPr lang="it-IT" smtClean="0"/>
-              <a:t>13/02/2018</a:t>
+              <a:t>19/02/2018</a:t>
             </a:fld>
             <a:endParaRPr lang="it-IT"/>
           </a:p>
@@ -1956,7 +1957,7 @@
           <a:p>
             <a:fld id="{BC1B2DE6-282A-4944-85CD-857AA4A79E28}" type="datetimeFigureOut">
               <a:rPr lang="it-IT" smtClean="0"/>
-              <a:t>13/02/2018</a:t>
+              <a:t>19/02/2018</a:t>
             </a:fld>
             <a:endParaRPr lang="it-IT"/>
           </a:p>
@@ -2069,7 +2070,7 @@
           <a:p>
             <a:fld id="{BC1B2DE6-282A-4944-85CD-857AA4A79E28}" type="datetimeFigureOut">
               <a:rPr lang="it-IT" smtClean="0"/>
-              <a:t>13/02/2018</a:t>
+              <a:t>19/02/2018</a:t>
             </a:fld>
             <a:endParaRPr lang="it-IT"/>
           </a:p>
@@ -2380,7 +2381,7 @@
           <a:p>
             <a:fld id="{BC1B2DE6-282A-4944-85CD-857AA4A79E28}" type="datetimeFigureOut">
               <a:rPr lang="it-IT" smtClean="0"/>
-              <a:t>13/02/2018</a:t>
+              <a:t>19/02/2018</a:t>
             </a:fld>
             <a:endParaRPr lang="it-IT"/>
           </a:p>
@@ -2668,7 +2669,7 @@
           <a:p>
             <a:fld id="{BC1B2DE6-282A-4944-85CD-857AA4A79E28}" type="datetimeFigureOut">
               <a:rPr lang="it-IT" smtClean="0"/>
-              <a:t>13/02/2018</a:t>
+              <a:t>19/02/2018</a:t>
             </a:fld>
             <a:endParaRPr lang="it-IT"/>
           </a:p>
@@ -2909,7 +2910,7 @@
           <a:p>
             <a:fld id="{BC1B2DE6-282A-4944-85CD-857AA4A79E28}" type="datetimeFigureOut">
               <a:rPr lang="it-IT" smtClean="0"/>
-              <a:t>13/02/2018</a:t>
+              <a:t>19/02/2018</a:t>
             </a:fld>
             <a:endParaRPr lang="it-IT"/>
           </a:p>
@@ -3328,6 +3329,618 @@
       </p:grpSpPr>
       <p:sp>
         <p:nvSpPr>
+          <p:cNvPr id="2" name="Titolo 1">
+            <a:extLst>
+              <a:ext uri="{FF2B5EF4-FFF2-40B4-BE49-F238E27FC236}">
+                <a16:creationId xmlns:a16="http://schemas.microsoft.com/office/drawing/2014/main" id="{0B46172A-3B3E-4178-898C-A106ACC02046}"/>
+              </a:ext>
+            </a:extLst>
+          </p:cNvPr>
+          <p:cNvSpPr>
+            <a:spLocks noGrp="1"/>
+          </p:cNvSpPr>
+          <p:nvPr>
+            <p:ph type="title"/>
+          </p:nvPr>
+        </p:nvSpPr>
+        <p:spPr/>
+        <p:txBody>
+          <a:bodyPr/>
+          <a:lstStyle/>
+          <a:p>
+            <a:r>
+              <a:rPr lang="it-IT" dirty="0"/>
+              <a:t>Introduzione RIM &amp; RIM PORTAL</a:t>
+            </a:r>
+          </a:p>
+        </p:txBody>
+      </p:sp>
+      <p:sp>
+        <p:nvSpPr>
+          <p:cNvPr id="5" name="Disco magnetico 4">
+            <a:extLst>
+              <a:ext uri="{FF2B5EF4-FFF2-40B4-BE49-F238E27FC236}">
+                <a16:creationId xmlns:a16="http://schemas.microsoft.com/office/drawing/2014/main" id="{73CC729E-448E-4431-81BB-FAD9C63DFB00}"/>
+              </a:ext>
+            </a:extLst>
+          </p:cNvPr>
+          <p:cNvSpPr/>
+          <p:nvPr/>
+        </p:nvSpPr>
+        <p:spPr>
+          <a:xfrm>
+            <a:off x="2450314" y="3711738"/>
+            <a:ext cx="821491" cy="976659"/>
+          </a:xfrm>
+          <a:prstGeom prst="flowChartMagneticDisk">
+            <a:avLst/>
+          </a:prstGeom>
+        </p:spPr>
+        <p:style>
+          <a:lnRef idx="2">
+            <a:schemeClr val="accent1">
+              <a:shade val="50000"/>
+            </a:schemeClr>
+          </a:lnRef>
+          <a:fillRef idx="1">
+            <a:schemeClr val="accent1"/>
+          </a:fillRef>
+          <a:effectRef idx="0">
+            <a:schemeClr val="accent1"/>
+          </a:effectRef>
+          <a:fontRef idx="minor">
+            <a:schemeClr val="lt1"/>
+          </a:fontRef>
+        </p:style>
+        <p:txBody>
+          <a:bodyPr rtlCol="0" anchor="ctr"/>
+          <a:lstStyle/>
+          <a:p>
+            <a:pPr algn="ctr"/>
+            <a:r>
+              <a:rPr lang="it-IT" sz="1600" dirty="0"/>
+              <a:t>DB RIM</a:t>
+            </a:r>
+          </a:p>
+        </p:txBody>
+      </p:sp>
+      <p:sp>
+        <p:nvSpPr>
+          <p:cNvPr id="6" name="Rettangolo 5">
+            <a:extLst>
+              <a:ext uri="{FF2B5EF4-FFF2-40B4-BE49-F238E27FC236}">
+                <a16:creationId xmlns:a16="http://schemas.microsoft.com/office/drawing/2014/main" id="{75204E4F-47F2-4736-A266-864DC24AD347}"/>
+              </a:ext>
+            </a:extLst>
+          </p:cNvPr>
+          <p:cNvSpPr/>
+          <p:nvPr/>
+        </p:nvSpPr>
+        <p:spPr>
+          <a:xfrm>
+            <a:off x="543967" y="1493657"/>
+            <a:ext cx="1175111" cy="1096525"/>
+          </a:xfrm>
+          <a:prstGeom prst="rect">
+            <a:avLst/>
+          </a:prstGeom>
+        </p:spPr>
+        <p:style>
+          <a:lnRef idx="2">
+            <a:schemeClr val="accent1">
+              <a:shade val="50000"/>
+            </a:schemeClr>
+          </a:lnRef>
+          <a:fillRef idx="1">
+            <a:schemeClr val="accent1"/>
+          </a:fillRef>
+          <a:effectRef idx="0">
+            <a:schemeClr val="accent1"/>
+          </a:effectRef>
+          <a:fontRef idx="minor">
+            <a:schemeClr val="lt1"/>
+          </a:fontRef>
+        </p:style>
+        <p:txBody>
+          <a:bodyPr rtlCol="0" anchor="ctr"/>
+          <a:lstStyle/>
+          <a:p>
+            <a:pPr algn="ctr"/>
+            <a:r>
+              <a:rPr lang="it-IT" dirty="0"/>
+              <a:t>RIM Portal</a:t>
+            </a:r>
+          </a:p>
+        </p:txBody>
+      </p:sp>
+      <p:sp>
+        <p:nvSpPr>
+          <p:cNvPr id="7" name="Rettangolo 6">
+            <a:extLst>
+              <a:ext uri="{FF2B5EF4-FFF2-40B4-BE49-F238E27FC236}">
+                <a16:creationId xmlns:a16="http://schemas.microsoft.com/office/drawing/2014/main" id="{D24BD692-9BC6-4814-A07E-CF7C7CA8A647}"/>
+              </a:ext>
+            </a:extLst>
+          </p:cNvPr>
+          <p:cNvSpPr/>
+          <p:nvPr/>
+        </p:nvSpPr>
+        <p:spPr>
+          <a:xfrm>
+            <a:off x="593602" y="3591872"/>
+            <a:ext cx="1175111" cy="1096525"/>
+          </a:xfrm>
+          <a:prstGeom prst="rect">
+            <a:avLst/>
+          </a:prstGeom>
+        </p:spPr>
+        <p:style>
+          <a:lnRef idx="2">
+            <a:schemeClr val="accent1">
+              <a:shade val="50000"/>
+            </a:schemeClr>
+          </a:lnRef>
+          <a:fillRef idx="1">
+            <a:schemeClr val="accent1"/>
+          </a:fillRef>
+          <a:effectRef idx="0">
+            <a:schemeClr val="accent1"/>
+          </a:effectRef>
+          <a:fontRef idx="minor">
+            <a:schemeClr val="lt1"/>
+          </a:fontRef>
+        </p:style>
+        <p:txBody>
+          <a:bodyPr rtlCol="0" anchor="ctr"/>
+          <a:lstStyle/>
+          <a:p>
+            <a:pPr algn="ctr"/>
+            <a:r>
+              <a:rPr lang="it-IT" dirty="0"/>
+              <a:t>RIM</a:t>
+            </a:r>
+          </a:p>
+        </p:txBody>
+      </p:sp>
+      <p:sp>
+        <p:nvSpPr>
+          <p:cNvPr id="8" name="Disco magnetico 7">
+            <a:extLst>
+              <a:ext uri="{FF2B5EF4-FFF2-40B4-BE49-F238E27FC236}">
+                <a16:creationId xmlns:a16="http://schemas.microsoft.com/office/drawing/2014/main" id="{F0A805EA-9CF9-4917-87D1-87FD0C6893D4}"/>
+              </a:ext>
+            </a:extLst>
+          </p:cNvPr>
+          <p:cNvSpPr/>
+          <p:nvPr/>
+        </p:nvSpPr>
+        <p:spPr>
+          <a:xfrm>
+            <a:off x="2273505" y="1679167"/>
+            <a:ext cx="1175111" cy="1096525"/>
+          </a:xfrm>
+          <a:prstGeom prst="flowChartMagneticDisk">
+            <a:avLst/>
+          </a:prstGeom>
+        </p:spPr>
+        <p:style>
+          <a:lnRef idx="2">
+            <a:schemeClr val="accent1">
+              <a:shade val="50000"/>
+            </a:schemeClr>
+          </a:lnRef>
+          <a:fillRef idx="1">
+            <a:schemeClr val="accent1"/>
+          </a:fillRef>
+          <a:effectRef idx="0">
+            <a:schemeClr val="accent1"/>
+          </a:effectRef>
+          <a:fontRef idx="minor">
+            <a:schemeClr val="lt1"/>
+          </a:fontRef>
+        </p:style>
+        <p:txBody>
+          <a:bodyPr rtlCol="0" anchor="ctr"/>
+          <a:lstStyle/>
+          <a:p>
+            <a:pPr algn="ctr"/>
+            <a:r>
+              <a:rPr lang="it-IT" sz="1600" dirty="0"/>
+              <a:t>DB RIM PORTAL</a:t>
+            </a:r>
+          </a:p>
+        </p:txBody>
+      </p:sp>
+      <p:sp>
+        <p:nvSpPr>
+          <p:cNvPr id="9" name="CasellaDiTesto 8">
+            <a:extLst>
+              <a:ext uri="{FF2B5EF4-FFF2-40B4-BE49-F238E27FC236}">
+                <a16:creationId xmlns:a16="http://schemas.microsoft.com/office/drawing/2014/main" id="{9779406F-79B3-471B-BE9D-1C0D98B4A699}"/>
+              </a:ext>
+            </a:extLst>
+          </p:cNvPr>
+          <p:cNvSpPr txBox="1"/>
+          <p:nvPr/>
+        </p:nvSpPr>
+        <p:spPr>
+          <a:xfrm>
+            <a:off x="3722366" y="3438773"/>
+            <a:ext cx="7975739" cy="2923877"/>
+          </a:xfrm>
+          <a:prstGeom prst="rect">
+            <a:avLst/>
+          </a:prstGeom>
+          <a:noFill/>
+        </p:spPr>
+        <p:txBody>
+          <a:bodyPr wrap="square" rtlCol="0">
+            <a:spAutoFit/>
+          </a:bodyPr>
+          <a:lstStyle/>
+          <a:p>
+            <a:r>
+              <a:rPr lang="it-IT" dirty="0"/>
+              <a:t>La </a:t>
+            </a:r>
+            <a:r>
+              <a:rPr lang="it-IT" dirty="0" err="1"/>
+              <a:t>Rim</a:t>
+            </a:r>
+            <a:r>
+              <a:rPr lang="it-IT" dirty="0"/>
+              <a:t> gestisce le sms machine e la </a:t>
+            </a:r>
+            <a:r>
+              <a:rPr lang="it-IT" dirty="0" err="1"/>
+              <a:t>chromebox</a:t>
+            </a:r>
+            <a:r>
+              <a:rPr lang="it-IT" dirty="0"/>
+              <a:t>, include un database che viene </a:t>
+            </a:r>
+            <a:r>
+              <a:rPr lang="it-IT" dirty="0" err="1"/>
+              <a:t>alimentanto</a:t>
+            </a:r>
+            <a:r>
+              <a:rPr lang="it-IT" dirty="0"/>
+              <a:t> dal contenuto di  file xml all’interno dei quali sono inclusi gli sms da inviare, organizzati secondo la seguente </a:t>
+            </a:r>
+            <a:r>
+              <a:rPr lang="it-IT" dirty="0" err="1"/>
+              <a:t>modalita’</a:t>
+            </a:r>
+            <a:r>
+              <a:rPr lang="it-IT" dirty="0"/>
+              <a:t>: </a:t>
+            </a:r>
+          </a:p>
+          <a:p>
+            <a:r>
+              <a:rPr lang="it-IT" sz="1000" i="1" dirty="0"/>
+              <a:t>&lt;?xml </a:t>
+            </a:r>
+            <a:r>
+              <a:rPr lang="it-IT" sz="1000" i="1" dirty="0" err="1"/>
+              <a:t>version</a:t>
+            </a:r>
+            <a:r>
+              <a:rPr lang="it-IT" sz="1000" i="1" dirty="0"/>
+              <a:t>="1.0" </a:t>
+            </a:r>
+            <a:r>
+              <a:rPr lang="it-IT" sz="1000" i="1" dirty="0" err="1"/>
+              <a:t>encoding</a:t>
+            </a:r>
+            <a:r>
+              <a:rPr lang="it-IT" sz="1000" i="1" dirty="0"/>
+              <a:t>="UTF-8"?&gt;</a:t>
+            </a:r>
+          </a:p>
+          <a:p>
+            <a:r>
+              <a:rPr lang="it-IT" sz="1000" i="1" dirty="0"/>
+              <a:t>&lt;</a:t>
+            </a:r>
+            <a:r>
+              <a:rPr lang="it-IT" sz="1000" i="1" dirty="0" err="1"/>
+              <a:t>services</a:t>
+            </a:r>
+            <a:r>
+              <a:rPr lang="it-IT" sz="1000" i="1" dirty="0"/>
+              <a:t>&gt;</a:t>
+            </a:r>
+          </a:p>
+          <a:p>
+            <a:r>
+              <a:rPr lang="it-IT" sz="1000" i="1" dirty="0"/>
+              <a:t>&lt;service&gt;</a:t>
+            </a:r>
+          </a:p>
+          <a:p>
+            <a:r>
+              <a:rPr lang="it-IT" sz="1000" i="1" dirty="0"/>
+              <a:t>&lt;</a:t>
+            </a:r>
+            <a:r>
+              <a:rPr lang="it-IT" sz="1000" i="1" dirty="0" err="1"/>
+              <a:t>serviceType</a:t>
+            </a:r>
+            <a:r>
+              <a:rPr lang="it-IT" sz="1000" i="1" dirty="0"/>
+              <a:t>&gt;2&lt;/</a:t>
+            </a:r>
+            <a:r>
+              <a:rPr lang="it-IT" sz="1000" i="1" dirty="0" err="1"/>
+              <a:t>serviceType</a:t>
+            </a:r>
+            <a:r>
+              <a:rPr lang="it-IT" sz="1000" i="1" dirty="0"/>
+              <a:t>&gt;</a:t>
+            </a:r>
+          </a:p>
+          <a:p>
+            <a:r>
+              <a:rPr lang="it-IT" sz="1000" i="1" dirty="0"/>
+              <a:t>&lt;</a:t>
+            </a:r>
+            <a:r>
+              <a:rPr lang="it-IT" sz="1000" i="1" dirty="0" err="1"/>
+              <a:t>message</a:t>
+            </a:r>
+            <a:r>
+              <a:rPr lang="it-IT" sz="1000" i="1" dirty="0"/>
+              <a:t>&gt;Gent. ANTONIO BIONDILLO il 17/02/2018 presso OSPEDALE DI CASERTA ha una prenotazione in OCULISTICA orario apertura reparto 11:00. Se vuole annullare o spostare la prenotazione chiami il </a:t>
+            </a:r>
+            <a:r>
+              <a:rPr lang="it-IT" sz="1000" i="1" dirty="0" err="1"/>
+              <a:t>num</a:t>
+            </a:r>
+            <a:r>
+              <a:rPr lang="it-IT" sz="1000" i="1" dirty="0"/>
+              <a:t>. 08231761547 dalle 08:00 alle 17:00, altrimenti risulta confermata.&lt;/</a:t>
+            </a:r>
+            <a:r>
+              <a:rPr lang="it-IT" sz="1000" i="1" dirty="0" err="1"/>
+              <a:t>message</a:t>
+            </a:r>
+            <a:r>
+              <a:rPr lang="it-IT" sz="1000" i="1" dirty="0"/>
+              <a:t>&gt;</a:t>
+            </a:r>
+          </a:p>
+          <a:p>
+            <a:r>
+              <a:rPr lang="it-IT" sz="1000" i="1" dirty="0"/>
+              <a:t>&lt;</a:t>
+            </a:r>
+            <a:r>
+              <a:rPr lang="it-IT" sz="1000" i="1" dirty="0" err="1"/>
+              <a:t>subject</a:t>
+            </a:r>
+            <a:r>
+              <a:rPr lang="it-IT" sz="1000" i="1" dirty="0"/>
+              <a:t>&gt;</a:t>
+            </a:r>
+          </a:p>
+          <a:p>
+            <a:r>
+              <a:rPr lang="it-IT" sz="1000" i="1" dirty="0"/>
+              <a:t>&lt;/</a:t>
+            </a:r>
+            <a:r>
+              <a:rPr lang="it-IT" sz="1000" i="1" dirty="0" err="1"/>
+              <a:t>subject</a:t>
+            </a:r>
+            <a:r>
+              <a:rPr lang="it-IT" sz="1000" i="1" dirty="0"/>
+              <a:t>&gt;</a:t>
+            </a:r>
+          </a:p>
+          <a:p>
+            <a:r>
+              <a:rPr lang="it-IT" sz="1000" i="1" dirty="0"/>
+              <a:t>&lt;</a:t>
+            </a:r>
+            <a:r>
+              <a:rPr lang="it-IT" sz="1000" i="1" dirty="0" err="1"/>
+              <a:t>destination</a:t>
+            </a:r>
+            <a:r>
+              <a:rPr lang="it-IT" sz="1000" i="1" dirty="0"/>
+              <a:t>&gt;3409232116&lt;/</a:t>
+            </a:r>
+            <a:r>
+              <a:rPr lang="it-IT" sz="1000" i="1" dirty="0" err="1"/>
+              <a:t>destination</a:t>
+            </a:r>
+            <a:r>
+              <a:rPr lang="it-IT" sz="1000" i="1" dirty="0"/>
+              <a:t>&gt;</a:t>
+            </a:r>
+          </a:p>
+          <a:p>
+            <a:r>
+              <a:rPr lang="it-IT" sz="1000" i="1" dirty="0"/>
+              <a:t>&lt;</a:t>
+            </a:r>
+            <a:r>
+              <a:rPr lang="it-IT" sz="1000" i="1" dirty="0" err="1"/>
+              <a:t>idTransaction</a:t>
+            </a:r>
+            <a:r>
+              <a:rPr lang="it-IT" sz="1000" i="1" dirty="0"/>
+              <a:t>&gt;150906-P-CC&lt;/</a:t>
+            </a:r>
+            <a:r>
+              <a:rPr lang="it-IT" sz="1000" i="1" dirty="0" err="1"/>
+              <a:t>idTransaction</a:t>
+            </a:r>
+            <a:r>
+              <a:rPr lang="it-IT" sz="1000" i="1" dirty="0"/>
+              <a:t>&gt;</a:t>
+            </a:r>
+          </a:p>
+          <a:p>
+            <a:r>
+              <a:rPr lang="it-IT" sz="1000" i="1" dirty="0"/>
+              <a:t>&lt;</a:t>
+            </a:r>
+            <a:r>
+              <a:rPr lang="it-IT" sz="1000" i="1" dirty="0" err="1"/>
+              <a:t>priority</a:t>
+            </a:r>
+            <a:r>
+              <a:rPr lang="it-IT" sz="1000" i="1" dirty="0"/>
+              <a:t>&gt;3&lt;/</a:t>
+            </a:r>
+            <a:r>
+              <a:rPr lang="it-IT" sz="1000" i="1" dirty="0" err="1"/>
+              <a:t>priority</a:t>
+            </a:r>
+            <a:r>
+              <a:rPr lang="it-IT" sz="1000" i="1" dirty="0"/>
+              <a:t>&gt;</a:t>
+            </a:r>
+          </a:p>
+          <a:p>
+            <a:r>
+              <a:rPr lang="it-IT" sz="1000" i="1" dirty="0"/>
+              <a:t>&lt;/service&gt;</a:t>
+            </a:r>
+          </a:p>
+          <a:p>
+            <a:r>
+              <a:rPr lang="it-IT" sz="1000" i="1" dirty="0"/>
+              <a:t>&lt;/</a:t>
+            </a:r>
+            <a:r>
+              <a:rPr lang="it-IT" sz="1000" i="1" dirty="0" err="1"/>
+              <a:t>services</a:t>
+            </a:r>
+            <a:r>
+              <a:rPr lang="it-IT" sz="1000" i="1" dirty="0"/>
+              <a:t>&gt;</a:t>
+            </a:r>
+          </a:p>
+        </p:txBody>
+      </p:sp>
+      <p:sp>
+        <p:nvSpPr>
+          <p:cNvPr id="10" name="CasellaDiTesto 9">
+            <a:extLst>
+              <a:ext uri="{FF2B5EF4-FFF2-40B4-BE49-F238E27FC236}">
+                <a16:creationId xmlns:a16="http://schemas.microsoft.com/office/drawing/2014/main" id="{75581FD8-9767-4B77-A9A8-12E09E5EFF77}"/>
+              </a:ext>
+            </a:extLst>
+          </p:cNvPr>
+          <p:cNvSpPr txBox="1"/>
+          <p:nvPr/>
+        </p:nvSpPr>
+        <p:spPr>
+          <a:xfrm>
+            <a:off x="3722366" y="1488765"/>
+            <a:ext cx="7722684" cy="1477328"/>
+          </a:xfrm>
+          <a:prstGeom prst="rect">
+            <a:avLst/>
+          </a:prstGeom>
+          <a:noFill/>
+        </p:spPr>
+        <p:txBody>
+          <a:bodyPr wrap="square" rtlCol="0">
+            <a:spAutoFit/>
+          </a:bodyPr>
+          <a:lstStyle/>
+          <a:p>
+            <a:r>
+              <a:rPr lang="it-IT" dirty="0"/>
+              <a:t>Il </a:t>
+            </a:r>
+            <a:r>
+              <a:rPr lang="it-IT" dirty="0" err="1"/>
+              <a:t>Rim</a:t>
+            </a:r>
+            <a:r>
+              <a:rPr lang="it-IT" dirty="0"/>
+              <a:t> Portal è una piattaforma basata su </a:t>
+            </a:r>
+            <a:r>
+              <a:rPr lang="it-IT" dirty="0" err="1"/>
+              <a:t>joomla</a:t>
+            </a:r>
+            <a:r>
+              <a:rPr lang="it-IT" dirty="0"/>
+              <a:t> che permette di visualizzare gli sms inviati, ricevuti e di interagire sullo stato del messaggio: da leggere, letto, aggiornato, gestito. Il </a:t>
+            </a:r>
+            <a:r>
+              <a:rPr lang="it-IT" dirty="0" err="1"/>
+              <a:t>Rimportal</a:t>
+            </a:r>
+            <a:r>
+              <a:rPr lang="it-IT" dirty="0"/>
+              <a:t> comunica con la </a:t>
+            </a:r>
+            <a:r>
+              <a:rPr lang="it-IT" dirty="0" err="1"/>
+              <a:t>Rim</a:t>
+            </a:r>
+            <a:r>
+              <a:rPr lang="it-IT" dirty="0"/>
+              <a:t> tramite servizi </a:t>
+            </a:r>
+            <a:r>
+              <a:rPr lang="it-IT" dirty="0" err="1"/>
+              <a:t>php</a:t>
+            </a:r>
+            <a:r>
+              <a:rPr lang="it-IT" dirty="0"/>
+              <a:t>. Uno dei servizi fondamentali è </a:t>
+            </a:r>
+            <a:r>
+              <a:rPr lang="it-IT" dirty="0" err="1"/>
+              <a:t>syncroRIM.php</a:t>
+            </a:r>
+            <a:r>
+              <a:rPr lang="it-IT" dirty="0"/>
+              <a:t> che permette di recuperare in maniera ordinata le statistiche, messaggi inviati e ricevuti</a:t>
+            </a:r>
+          </a:p>
+        </p:txBody>
+      </p:sp>
+    </p:spTree>
+    <p:extLst>
+      <p:ext uri="{BB962C8B-B14F-4D97-AF65-F5344CB8AC3E}">
+        <p14:creationId xmlns:p14="http://schemas.microsoft.com/office/powerpoint/2010/main" val="1389850169"/>
+      </p:ext>
+    </p:extLst>
+  </p:cSld>
+  <p:clrMapOvr>
+    <a:masterClrMapping/>
+  </p:clrMapOvr>
+</p:sld>
+</file>
+
+<file path=ppt/slides/slide2.xml><?xml version="1.0" encoding="utf-8"?>
+<p:sld xmlns:a="http://schemas.openxmlformats.org/drawingml/2006/main" xmlns:r="http://schemas.openxmlformats.org/officeDocument/2006/relationships" xmlns:p="http://schemas.openxmlformats.org/presentationml/2006/main">
+  <p:cSld>
+    <p:spTree>
+      <p:nvGrpSpPr>
+        <p:cNvPr id="1" name=""/>
+        <p:cNvGrpSpPr/>
+        <p:nvPr/>
+      </p:nvGrpSpPr>
+      <p:grpSpPr>
+        <a:xfrm>
+          <a:off x="0" y="0"/>
+          <a:ext cx="0" cy="0"/>
+          <a:chOff x="0" y="0"/>
+          <a:chExt cx="0" cy="0"/>
+        </a:xfrm>
+      </p:grpSpPr>
+      <p:sp>
+        <p:nvSpPr>
           <p:cNvPr id="3" name="Sottotitolo 2">
             <a:extLst>
               <a:ext uri="{FF2B5EF4-FFF2-40B4-BE49-F238E27FC236}">
@@ -3354,7 +3967,7 @@
           <a:p>
             <a:r>
               <a:rPr lang="it-IT" dirty="0"/>
-              <a:t>Architettura SMS</a:t>
+              <a:t>Nuova Architettura SMS</a:t>
             </a:r>
           </a:p>
         </p:txBody>
@@ -3574,8 +4187,8 @@
         </p:nvSpPr>
         <p:spPr>
           <a:xfrm>
-            <a:off x="2600113" y="1088930"/>
-            <a:ext cx="929430" cy="808420"/>
+            <a:off x="2600112" y="1088930"/>
+            <a:ext cx="1175111" cy="808420"/>
           </a:xfrm>
           <a:prstGeom prst="rect">
             <a:avLst/>
@@ -3610,7 +4223,7 @@
             <a:pPr algn="ctr"/>
             <a:r>
               <a:rPr lang="it-IT" dirty="0"/>
-              <a:t>Box GSM</a:t>
+              <a:t>SMS MACHINE</a:t>
             </a:r>
           </a:p>
         </p:txBody>
@@ -3625,6 +4238,7 @@
             </a:extLst>
           </p:cNvPr>
           <p:cNvCxnSpPr>
+            <a:cxnSpLocks/>
             <a:stCxn id="10" idx="1"/>
             <a:endCxn id="9" idx="3"/>
           </p:cNvCxnSpPr>
@@ -3632,8 +4246,8 @@
         </p:nvCxnSpPr>
         <p:spPr>
           <a:xfrm rot="10800000" flipV="1">
-            <a:off x="1534520" y="1493139"/>
-            <a:ext cx="1065593" cy="3495"/>
+            <a:off x="1534520" y="1493140"/>
+            <a:ext cx="1065592" cy="3496"/>
           </a:xfrm>
           <a:prstGeom prst="bentConnector3">
             <a:avLst/>
@@ -4455,6 +5069,7 @@
             </a:extLst>
           </p:cNvPr>
           <p:cNvCxnSpPr>
+            <a:cxnSpLocks/>
             <a:stCxn id="37" idx="2"/>
             <a:endCxn id="10" idx="3"/>
           </p:cNvCxnSpPr>
@@ -4462,8 +5077,8 @@
         </p:nvCxnSpPr>
         <p:spPr>
           <a:xfrm rot="10800000" flipV="1">
-            <a:off x="3529542" y="1493138"/>
-            <a:ext cx="4327150" cy="2"/>
+            <a:off x="3775224" y="1493138"/>
+            <a:ext cx="4081469" cy="1"/>
           </a:xfrm>
           <a:prstGeom prst="bentConnector3">
             <a:avLst/>

</xml_diff>